<commit_message>
[MEL-0005] - Personality presentation
</commit_message>
<xml_diff>
--- a/Presentations/Coaching.pptx
+++ b/Presentations/Coaching.pptx
@@ -215,7 +215,7 @@
           <a:p>
             <a:fld id="{BE922CAB-3410-47F5-A79E-CF5894AF3626}" type="datetimeFigureOut">
               <a:rPr lang="pt-PT" smtClean="0"/>
-              <a:t>06/08/2020</a:t>
+              <a:t>23/08/2020</a:t>
             </a:fld>
             <a:endParaRPr lang="pt-PT"/>
           </a:p>
@@ -374,7 +374,7 @@
           <a:p>
             <a:fld id="{A3A1918A-EBEF-4566-AEC8-1165858BF98D}" type="slidenum">
               <a:rPr lang="pt-PT" smtClean="0"/>
-              <a:t>‹#›</a:t>
+              <a:t>‹nº›</a:t>
             </a:fld>
             <a:endParaRPr lang="pt-PT"/>
           </a:p>
@@ -632,7 +632,7 @@
           <a:p>
             <a:fld id="{A18E2B5E-2BAC-408C-9D01-DD90C7E8DCBE}" type="datetimeFigureOut">
               <a:rPr lang="pt-PT" smtClean="0"/>
-              <a:t>06/08/2020</a:t>
+              <a:t>23/08/2020</a:t>
             </a:fld>
             <a:endParaRPr lang="pt-PT"/>
           </a:p>
@@ -686,7 +686,7 @@
           <a:p>
             <a:fld id="{F626F722-DB2D-45A8-8D9B-2FEA8CFC5936}" type="slidenum">
               <a:rPr lang="pt-PT" smtClean="0"/>
-              <a:t>‹#›</a:t>
+              <a:t>‹nº›</a:t>
             </a:fld>
             <a:endParaRPr lang="pt-PT"/>
           </a:p>
@@ -844,7 +844,7 @@
           <a:p>
             <a:fld id="{A18E2B5E-2BAC-408C-9D01-DD90C7E8DCBE}" type="datetimeFigureOut">
               <a:rPr lang="pt-PT" smtClean="0"/>
-              <a:t>06/08/2020</a:t>
+              <a:t>23/08/2020</a:t>
             </a:fld>
             <a:endParaRPr lang="pt-PT"/>
           </a:p>
@@ -898,7 +898,7 @@
           <a:p>
             <a:fld id="{F626F722-DB2D-45A8-8D9B-2FEA8CFC5936}" type="slidenum">
               <a:rPr lang="pt-PT" smtClean="0"/>
-              <a:t>‹#›</a:t>
+              <a:t>‹nº›</a:t>
             </a:fld>
             <a:endParaRPr lang="pt-PT"/>
           </a:p>
@@ -1066,7 +1066,7 @@
           <a:p>
             <a:fld id="{A18E2B5E-2BAC-408C-9D01-DD90C7E8DCBE}" type="datetimeFigureOut">
               <a:rPr lang="pt-PT" smtClean="0"/>
-              <a:t>06/08/2020</a:t>
+              <a:t>23/08/2020</a:t>
             </a:fld>
             <a:endParaRPr lang="pt-PT"/>
           </a:p>
@@ -1120,7 +1120,7 @@
           <a:p>
             <a:fld id="{F626F722-DB2D-45A8-8D9B-2FEA8CFC5936}" type="slidenum">
               <a:rPr lang="pt-PT" smtClean="0"/>
-              <a:t>‹#›</a:t>
+              <a:t>‹nº›</a:t>
             </a:fld>
             <a:endParaRPr lang="pt-PT"/>
           </a:p>
@@ -1278,7 +1278,7 @@
           <a:p>
             <a:fld id="{A18E2B5E-2BAC-408C-9D01-DD90C7E8DCBE}" type="datetimeFigureOut">
               <a:rPr lang="pt-PT" smtClean="0"/>
-              <a:t>06/08/2020</a:t>
+              <a:t>23/08/2020</a:t>
             </a:fld>
             <a:endParaRPr lang="pt-PT"/>
           </a:p>
@@ -1332,7 +1332,7 @@
           <a:p>
             <a:fld id="{F626F722-DB2D-45A8-8D9B-2FEA8CFC5936}" type="slidenum">
               <a:rPr lang="pt-PT" smtClean="0"/>
-              <a:t>‹#›</a:t>
+              <a:t>‹nº›</a:t>
             </a:fld>
             <a:endParaRPr lang="pt-PT"/>
           </a:p>
@@ -1566,7 +1566,7 @@
           <a:p>
             <a:fld id="{A18E2B5E-2BAC-408C-9D01-DD90C7E8DCBE}" type="datetimeFigureOut">
               <a:rPr lang="pt-PT" smtClean="0"/>
-              <a:t>06/08/2020</a:t>
+              <a:t>23/08/2020</a:t>
             </a:fld>
             <a:endParaRPr lang="pt-PT"/>
           </a:p>
@@ -1620,7 +1620,7 @@
           <a:p>
             <a:fld id="{F626F722-DB2D-45A8-8D9B-2FEA8CFC5936}" type="slidenum">
               <a:rPr lang="pt-PT" smtClean="0"/>
-              <a:t>‹#›</a:t>
+              <a:t>‹nº›</a:t>
             </a:fld>
             <a:endParaRPr lang="pt-PT"/>
           </a:p>
@@ -1846,7 +1846,7 @@
           <a:p>
             <a:fld id="{A18E2B5E-2BAC-408C-9D01-DD90C7E8DCBE}" type="datetimeFigureOut">
               <a:rPr lang="pt-PT" smtClean="0"/>
-              <a:t>06/08/2020</a:t>
+              <a:t>23/08/2020</a:t>
             </a:fld>
             <a:endParaRPr lang="pt-PT"/>
           </a:p>
@@ -1900,7 +1900,7 @@
           <a:p>
             <a:fld id="{F626F722-DB2D-45A8-8D9B-2FEA8CFC5936}" type="slidenum">
               <a:rPr lang="pt-PT" smtClean="0"/>
-              <a:t>‹#›</a:t>
+              <a:t>‹nº›</a:t>
             </a:fld>
             <a:endParaRPr lang="pt-PT"/>
           </a:p>
@@ -2273,7 +2273,7 @@
           <a:p>
             <a:fld id="{A18E2B5E-2BAC-408C-9D01-DD90C7E8DCBE}" type="datetimeFigureOut">
               <a:rPr lang="pt-PT" smtClean="0"/>
-              <a:t>06/08/2020</a:t>
+              <a:t>23/08/2020</a:t>
             </a:fld>
             <a:endParaRPr lang="pt-PT"/>
           </a:p>
@@ -2327,7 +2327,7 @@
           <a:p>
             <a:fld id="{F626F722-DB2D-45A8-8D9B-2FEA8CFC5936}" type="slidenum">
               <a:rPr lang="pt-PT" smtClean="0"/>
-              <a:t>‹#›</a:t>
+              <a:t>‹nº›</a:t>
             </a:fld>
             <a:endParaRPr lang="pt-PT"/>
           </a:p>
@@ -2427,7 +2427,7 @@
           <a:p>
             <a:fld id="{A18E2B5E-2BAC-408C-9D01-DD90C7E8DCBE}" type="datetimeFigureOut">
               <a:rPr lang="pt-PT" smtClean="0"/>
-              <a:t>06/08/2020</a:t>
+              <a:t>23/08/2020</a:t>
             </a:fld>
             <a:endParaRPr lang="pt-PT"/>
           </a:p>
@@ -2481,7 +2481,7 @@
           <a:p>
             <a:fld id="{F626F722-DB2D-45A8-8D9B-2FEA8CFC5936}" type="slidenum">
               <a:rPr lang="pt-PT" smtClean="0"/>
-              <a:t>‹#›</a:t>
+              <a:t>‹nº›</a:t>
             </a:fld>
             <a:endParaRPr lang="pt-PT"/>
           </a:p>
@@ -2552,7 +2552,7 @@
           <a:p>
             <a:fld id="{A18E2B5E-2BAC-408C-9D01-DD90C7E8DCBE}" type="datetimeFigureOut">
               <a:rPr lang="pt-PT" smtClean="0"/>
-              <a:t>06/08/2020</a:t>
+              <a:t>23/08/2020</a:t>
             </a:fld>
             <a:endParaRPr lang="pt-PT"/>
           </a:p>
@@ -2606,7 +2606,7 @@
           <a:p>
             <a:fld id="{F626F722-DB2D-45A8-8D9B-2FEA8CFC5936}" type="slidenum">
               <a:rPr lang="pt-PT" smtClean="0"/>
-              <a:t>‹#›</a:t>
+              <a:t>‹nº›</a:t>
             </a:fld>
             <a:endParaRPr lang="pt-PT"/>
           </a:p>
@@ -2877,7 +2877,7 @@
           <a:p>
             <a:fld id="{A18E2B5E-2BAC-408C-9D01-DD90C7E8DCBE}" type="datetimeFigureOut">
               <a:rPr lang="pt-PT" smtClean="0"/>
-              <a:t>06/08/2020</a:t>
+              <a:t>23/08/2020</a:t>
             </a:fld>
             <a:endParaRPr lang="pt-PT"/>
           </a:p>
@@ -2931,7 +2931,7 @@
           <a:p>
             <a:fld id="{F626F722-DB2D-45A8-8D9B-2FEA8CFC5936}" type="slidenum">
               <a:rPr lang="pt-PT" smtClean="0"/>
-              <a:t>‹#›</a:t>
+              <a:t>‹nº›</a:t>
             </a:fld>
             <a:endParaRPr lang="pt-PT"/>
           </a:p>
@@ -3178,7 +3178,7 @@
           <a:p>
             <a:fld id="{A18E2B5E-2BAC-408C-9D01-DD90C7E8DCBE}" type="datetimeFigureOut">
               <a:rPr lang="pt-PT" smtClean="0"/>
-              <a:t>06/08/2020</a:t>
+              <a:t>23/08/2020</a:t>
             </a:fld>
             <a:endParaRPr lang="pt-PT"/>
           </a:p>
@@ -3232,7 +3232,7 @@
           <a:p>
             <a:fld id="{F626F722-DB2D-45A8-8D9B-2FEA8CFC5936}" type="slidenum">
               <a:rPr lang="pt-PT" smtClean="0"/>
-              <a:t>‹#›</a:t>
+              <a:t>‹nº›</a:t>
             </a:fld>
             <a:endParaRPr lang="pt-PT"/>
           </a:p>
@@ -3433,7 +3433,7 @@
           <a:p>
             <a:fld id="{A18E2B5E-2BAC-408C-9D01-DD90C7E8DCBE}" type="datetimeFigureOut">
               <a:rPr lang="pt-PT" smtClean="0"/>
-              <a:t>06/08/2020</a:t>
+              <a:t>23/08/2020</a:t>
             </a:fld>
             <a:endParaRPr lang="pt-PT"/>
           </a:p>
@@ -3523,7 +3523,7 @@
           <a:p>
             <a:fld id="{F626F722-DB2D-45A8-8D9B-2FEA8CFC5936}" type="slidenum">
               <a:rPr lang="pt-PT" smtClean="0"/>
-              <a:t>‹#›</a:t>
+              <a:t>‹nº›</a:t>
             </a:fld>
             <a:endParaRPr lang="pt-PT"/>
           </a:p>

</xml_diff>